<commit_message>
update high to low
</commit_message>
<xml_diff>
--- a/ppt/highlow_flow.pptx
+++ b/ppt/highlow_flow.pptx
@@ -5,9 +5,11 @@
     <p:sldMasterId id="2147483648" r:id="rId1"/>
   </p:sldMasterIdLst>
   <p:sldIdLst>
-    <p:sldId id="256" r:id="rId2"/>
-    <p:sldId id="257" r:id="rId3"/>
-    <p:sldId id="258" r:id="rId4"/>
+    <p:sldId id="259" r:id="rId2"/>
+    <p:sldId id="260" r:id="rId3"/>
+    <p:sldId id="256" r:id="rId4"/>
+    <p:sldId id="257" r:id="rId5"/>
+    <p:sldId id="258" r:id="rId6"/>
   </p:sldIdLst>
   <p:sldSz cx="12192000" cy="6858000"/>
   <p:notesSz cx="6858000" cy="9144000"/>
@@ -106,6 +108,11 @@
       </a:defRPr>
     </a:lvl9pPr>
   </p:defaultTextStyle>
+  <p:extLst>
+    <p:ext uri="{EFAFB233-063F-42B5-8137-9DF3F51BA10A}">
+      <p15:sldGuideLst xmlns:p15="http://schemas.microsoft.com/office/powerpoint/2012/main"/>
+    </p:ext>
+  </p:extLst>
 </p:presentation>
 </file>
 
@@ -258,7 +265,7 @@
           <a:p>
             <a:fld id="{01DCDA48-5C5D-D546-9EC3-3C048A687368}" type="datetimeFigureOut">
               <a:rPr kumimoji="1" lang="ko-Kore-KR" altLang="en-US" smtClean="0"/>
-              <a:t>2022. 2. 21.</a:t>
+              <a:t>2022. 2. 23.</a:t>
             </a:fld>
             <a:endParaRPr kumimoji="1" lang="ko-Kore-KR" altLang="en-US"/>
           </a:p>
@@ -458,7 +465,7 @@
           <a:p>
             <a:fld id="{01DCDA48-5C5D-D546-9EC3-3C048A687368}" type="datetimeFigureOut">
               <a:rPr kumimoji="1" lang="ko-Kore-KR" altLang="en-US" smtClean="0"/>
-              <a:t>2022. 2. 21.</a:t>
+              <a:t>2022. 2. 23.</a:t>
             </a:fld>
             <a:endParaRPr kumimoji="1" lang="ko-Kore-KR" altLang="en-US"/>
           </a:p>
@@ -668,7 +675,7 @@
           <a:p>
             <a:fld id="{01DCDA48-5C5D-D546-9EC3-3C048A687368}" type="datetimeFigureOut">
               <a:rPr kumimoji="1" lang="ko-Kore-KR" altLang="en-US" smtClean="0"/>
-              <a:t>2022. 2. 21.</a:t>
+              <a:t>2022. 2. 23.</a:t>
             </a:fld>
             <a:endParaRPr kumimoji="1" lang="ko-Kore-KR" altLang="en-US"/>
           </a:p>
@@ -868,7 +875,7 @@
           <a:p>
             <a:fld id="{01DCDA48-5C5D-D546-9EC3-3C048A687368}" type="datetimeFigureOut">
               <a:rPr kumimoji="1" lang="ko-Kore-KR" altLang="en-US" smtClean="0"/>
-              <a:t>2022. 2. 21.</a:t>
+              <a:t>2022. 2. 23.</a:t>
             </a:fld>
             <a:endParaRPr kumimoji="1" lang="ko-Kore-KR" altLang="en-US"/>
           </a:p>
@@ -1144,7 +1151,7 @@
           <a:p>
             <a:fld id="{01DCDA48-5C5D-D546-9EC3-3C048A687368}" type="datetimeFigureOut">
               <a:rPr kumimoji="1" lang="ko-Kore-KR" altLang="en-US" smtClean="0"/>
-              <a:t>2022. 2. 21.</a:t>
+              <a:t>2022. 2. 23.</a:t>
             </a:fld>
             <a:endParaRPr kumimoji="1" lang="ko-Kore-KR" altLang="en-US"/>
           </a:p>
@@ -1412,7 +1419,7 @@
           <a:p>
             <a:fld id="{01DCDA48-5C5D-D546-9EC3-3C048A687368}" type="datetimeFigureOut">
               <a:rPr kumimoji="1" lang="ko-Kore-KR" altLang="en-US" smtClean="0"/>
-              <a:t>2022. 2. 21.</a:t>
+              <a:t>2022. 2. 23.</a:t>
             </a:fld>
             <a:endParaRPr kumimoji="1" lang="ko-Kore-KR" altLang="en-US"/>
           </a:p>
@@ -1827,7 +1834,7 @@
           <a:p>
             <a:fld id="{01DCDA48-5C5D-D546-9EC3-3C048A687368}" type="datetimeFigureOut">
               <a:rPr kumimoji="1" lang="ko-Kore-KR" altLang="en-US" smtClean="0"/>
-              <a:t>2022. 2. 21.</a:t>
+              <a:t>2022. 2. 23.</a:t>
             </a:fld>
             <a:endParaRPr kumimoji="1" lang="ko-Kore-KR" altLang="en-US"/>
           </a:p>
@@ -1969,7 +1976,7 @@
           <a:p>
             <a:fld id="{01DCDA48-5C5D-D546-9EC3-3C048A687368}" type="datetimeFigureOut">
               <a:rPr kumimoji="1" lang="ko-Kore-KR" altLang="en-US" smtClean="0"/>
-              <a:t>2022. 2. 21.</a:t>
+              <a:t>2022. 2. 23.</a:t>
             </a:fld>
             <a:endParaRPr kumimoji="1" lang="ko-Kore-KR" altLang="en-US"/>
           </a:p>
@@ -2082,7 +2089,7 @@
           <a:p>
             <a:fld id="{01DCDA48-5C5D-D546-9EC3-3C048A687368}" type="datetimeFigureOut">
               <a:rPr kumimoji="1" lang="ko-Kore-KR" altLang="en-US" smtClean="0"/>
-              <a:t>2022. 2. 21.</a:t>
+              <a:t>2022. 2. 23.</a:t>
             </a:fld>
             <a:endParaRPr kumimoji="1" lang="ko-Kore-KR" altLang="en-US"/>
           </a:p>
@@ -2395,7 +2402,7 @@
           <a:p>
             <a:fld id="{01DCDA48-5C5D-D546-9EC3-3C048A687368}" type="datetimeFigureOut">
               <a:rPr kumimoji="1" lang="ko-Kore-KR" altLang="en-US" smtClean="0"/>
-              <a:t>2022. 2. 21.</a:t>
+              <a:t>2022. 2. 23.</a:t>
             </a:fld>
             <a:endParaRPr kumimoji="1" lang="ko-Kore-KR" altLang="en-US"/>
           </a:p>
@@ -2684,7 +2691,7 @@
           <a:p>
             <a:fld id="{01DCDA48-5C5D-D546-9EC3-3C048A687368}" type="datetimeFigureOut">
               <a:rPr kumimoji="1" lang="ko-Kore-KR" altLang="en-US" smtClean="0"/>
-              <a:t>2022. 2. 21.</a:t>
+              <a:t>2022. 2. 23.</a:t>
             </a:fld>
             <a:endParaRPr kumimoji="1" lang="ko-Kore-KR" altLang="en-US"/>
           </a:p>
@@ -2927,7 +2934,7 @@
           <a:p>
             <a:fld id="{01DCDA48-5C5D-D546-9EC3-3C048A687368}" type="datetimeFigureOut">
               <a:rPr kumimoji="1" lang="ko-Kore-KR" altLang="en-US" smtClean="0"/>
-              <a:t>2022. 2. 21.</a:t>
+              <a:t>2022. 2. 23.</a:t>
             </a:fld>
             <a:endParaRPr kumimoji="1" lang="ko-Kore-KR" altLang="en-US"/>
           </a:p>
@@ -3346,6 +3353,370 @@
       </p:grpSpPr>
       <p:sp>
         <p:nvSpPr>
+          <p:cNvPr id="2" name="제목 1">
+            <a:extLst>
+              <a:ext uri="{FF2B5EF4-FFF2-40B4-BE49-F238E27FC236}">
+                <a16:creationId xmlns:a16="http://schemas.microsoft.com/office/drawing/2014/main" id="{1A2B7EF2-65BC-2242-9B99-2A55B7D089D3}"/>
+              </a:ext>
+            </a:extLst>
+          </p:cNvPr>
+          <p:cNvSpPr>
+            <a:spLocks noGrp="1"/>
+          </p:cNvSpPr>
+          <p:nvPr>
+            <p:ph type="title"/>
+          </p:nvPr>
+        </p:nvSpPr>
+        <p:spPr/>
+        <p:txBody>
+          <a:bodyPr>
+            <a:normAutofit/>
+          </a:bodyPr>
+          <a:lstStyle/>
+          <a:p>
+            <a:r>
+              <a:rPr lang="ko-KR" altLang="ko-Kore-KR" sz="3200" dirty="0">
+                <a:latin typeface="BM DoHyeon OTF" panose="020B0600000101010101" pitchFamily="34" charset="-127"/>
+                <a:ea typeface="BM DoHyeon OTF" panose="020B0600000101010101" pitchFamily="34" charset="-127"/>
+              </a:rPr>
+              <a:t>형태소 변환기를 사용한 존댓말 반말 변환기</a:t>
+            </a:r>
+            <a:endParaRPr kumimoji="1" lang="ko-Kore-KR" altLang="en-US" sz="3200" dirty="0">
+              <a:latin typeface="BM DoHyeon OTF" panose="020B0600000101010101" pitchFamily="34" charset="-127"/>
+              <a:ea typeface="BM DoHyeon OTF" panose="020B0600000101010101" pitchFamily="34" charset="-127"/>
+            </a:endParaRPr>
+          </a:p>
+        </p:txBody>
+      </p:sp>
+      <p:sp>
+        <p:nvSpPr>
+          <p:cNvPr id="3" name="내용 개체 틀 2">
+            <a:extLst>
+              <a:ext uri="{FF2B5EF4-FFF2-40B4-BE49-F238E27FC236}">
+                <a16:creationId xmlns:a16="http://schemas.microsoft.com/office/drawing/2014/main" id="{F0A06DA7-D300-B14F-A5AA-F3A6A5A3250D}"/>
+              </a:ext>
+            </a:extLst>
+          </p:cNvPr>
+          <p:cNvSpPr>
+            <a:spLocks noGrp="1"/>
+          </p:cNvSpPr>
+          <p:nvPr>
+            <p:ph idx="1"/>
+          </p:nvPr>
+        </p:nvSpPr>
+        <p:spPr/>
+        <p:txBody>
+          <a:bodyPr>
+            <a:normAutofit fontScale="92500" lnSpcReduction="20000"/>
+          </a:bodyPr>
+          <a:lstStyle/>
+          <a:p>
+            <a:pPr>
+              <a:lnSpc>
+                <a:spcPct val="150000"/>
+              </a:lnSpc>
+            </a:pPr>
+            <a:r>
+              <a:rPr lang="ko-KR" altLang="ko-Kore-KR" b="1" dirty="0"/>
+              <a:t>설계의 목적</a:t>
+            </a:r>
+            <a:r>
+              <a:rPr lang="en-US" altLang="ko-Kore-KR" dirty="0"/>
+              <a:t>: </a:t>
+            </a:r>
+            <a:r>
+              <a:rPr lang="ko-KR" altLang="ko-Kore-KR" dirty="0"/>
+              <a:t>한국어는 교착어로</a:t>
+            </a:r>
+            <a:r>
+              <a:rPr lang="en-US" altLang="ko-Kore-KR" dirty="0"/>
+              <a:t>, </a:t>
+            </a:r>
+            <a:r>
+              <a:rPr lang="ko-KR" altLang="ko-Kore-KR" dirty="0"/>
+              <a:t>높임말과 반말이 존재하며 이는 상황과 장소에 따라 다르게 사용됩니다</a:t>
+            </a:r>
+            <a:r>
+              <a:rPr lang="en-US" altLang="ko-Kore-KR" dirty="0"/>
+              <a:t>. </a:t>
+            </a:r>
+            <a:r>
+              <a:rPr lang="ko-KR" altLang="ko-Kore-KR" dirty="0"/>
+              <a:t>의미는 같으나 다양한 </a:t>
+            </a:r>
+            <a:r>
+              <a:rPr lang="ko-KR" altLang="ko-Kore-KR" dirty="0" err="1"/>
+              <a:t>어체로</a:t>
+            </a:r>
+            <a:r>
+              <a:rPr lang="ko-KR" altLang="ko-Kore-KR" dirty="0"/>
+              <a:t> 사용이 가능하며 이로 인해 다른 언어보다 번역이 까다롭습니다</a:t>
+            </a:r>
+            <a:r>
+              <a:rPr lang="en-US" altLang="ko-Kore-KR" dirty="0"/>
+              <a:t>. </a:t>
+            </a:r>
+            <a:r>
+              <a:rPr lang="ko-KR" altLang="ko-Kore-KR" dirty="0"/>
+              <a:t>따라서 저희 팀은 </a:t>
+            </a:r>
+            <a:r>
+              <a:rPr lang="ko-KR" altLang="ko-Kore-KR" dirty="0" err="1"/>
+              <a:t>딥러닝</a:t>
+            </a:r>
+            <a:r>
+              <a:rPr lang="ko-KR" altLang="ko-Kore-KR" dirty="0"/>
+              <a:t> 모델에 한국어 데이터를 학습시킬 때</a:t>
+            </a:r>
+            <a:r>
+              <a:rPr lang="en-US" altLang="ko-Kore-KR" dirty="0"/>
+              <a:t>, </a:t>
+            </a:r>
+            <a:r>
+              <a:rPr lang="ko-KR" altLang="ko-Kore-KR" dirty="0"/>
+              <a:t>모든 한국어를 높임말 또는 반말로 통일하여 학습을 시켰을 때 번역의 품질이 향상되는지 확인해보고</a:t>
+            </a:r>
+            <a:r>
+              <a:rPr lang="en-US" altLang="ko-Kore-KR" dirty="0"/>
+              <a:t>, </a:t>
+            </a:r>
+            <a:r>
+              <a:rPr lang="ko-KR" altLang="ko-Kore-KR" dirty="0"/>
+              <a:t>번역된 결과를 높임말 또는 반말로 통일시켜 사용자가 결과 문장을 읽을 때의 </a:t>
+            </a:r>
+            <a:r>
+              <a:rPr lang="ko-KR" altLang="ko-Kore-KR" dirty="0" err="1"/>
+              <a:t>가독성을</a:t>
+            </a:r>
+            <a:r>
+              <a:rPr lang="ko-KR" altLang="ko-Kore-KR" dirty="0"/>
+              <a:t> 높이고자 높임말 반말 변환 코드를 개발하였습니다</a:t>
+            </a:r>
+            <a:r>
+              <a:rPr lang="en-US" altLang="ko-Kore-KR" dirty="0"/>
+              <a:t>.</a:t>
+            </a:r>
+            <a:endParaRPr lang="ko-Kore-KR" altLang="ko-Kore-KR" dirty="0"/>
+          </a:p>
+          <a:p>
+            <a:endParaRPr kumimoji="1" lang="ko-Kore-KR" altLang="en-US" dirty="0"/>
+          </a:p>
+        </p:txBody>
+      </p:sp>
+    </p:spTree>
+    <p:extLst>
+      <p:ext uri="{BB962C8B-B14F-4D97-AF65-F5344CB8AC3E}">
+        <p14:creationId xmlns:p14="http://schemas.microsoft.com/office/powerpoint/2010/main" val="764923693"/>
+      </p:ext>
+    </p:extLst>
+  </p:cSld>
+  <p:clrMapOvr>
+    <a:masterClrMapping/>
+  </p:clrMapOvr>
+</p:sld>
+</file>
+
+<file path=ppt/slides/slide2.xml><?xml version="1.0" encoding="utf-8"?>
+<p:sld xmlns:a="http://schemas.openxmlformats.org/drawingml/2006/main" xmlns:r="http://schemas.openxmlformats.org/officeDocument/2006/relationships" xmlns:p="http://schemas.openxmlformats.org/presentationml/2006/main">
+  <p:cSld>
+    <p:spTree>
+      <p:nvGrpSpPr>
+        <p:cNvPr id="1" name=""/>
+        <p:cNvGrpSpPr/>
+        <p:nvPr/>
+      </p:nvGrpSpPr>
+      <p:grpSpPr>
+        <a:xfrm>
+          <a:off x="0" y="0"/>
+          <a:ext cx="0" cy="0"/>
+          <a:chOff x="0" y="0"/>
+          <a:chExt cx="0" cy="0"/>
+        </a:xfrm>
+      </p:grpSpPr>
+      <p:sp>
+        <p:nvSpPr>
+          <p:cNvPr id="2" name="제목 1">
+            <a:extLst>
+              <a:ext uri="{FF2B5EF4-FFF2-40B4-BE49-F238E27FC236}">
+                <a16:creationId xmlns:a16="http://schemas.microsoft.com/office/drawing/2014/main" id="{1A2B7EF2-65BC-2242-9B99-2A55B7D089D3}"/>
+              </a:ext>
+            </a:extLst>
+          </p:cNvPr>
+          <p:cNvSpPr>
+            <a:spLocks noGrp="1"/>
+          </p:cNvSpPr>
+          <p:nvPr>
+            <p:ph type="title"/>
+          </p:nvPr>
+        </p:nvSpPr>
+        <p:spPr/>
+        <p:txBody>
+          <a:bodyPr>
+            <a:normAutofit/>
+          </a:bodyPr>
+          <a:lstStyle/>
+          <a:p>
+            <a:r>
+              <a:rPr lang="ko-KR" altLang="ko-Kore-KR" sz="3200" dirty="0">
+                <a:latin typeface="BM DoHyeon OTF" panose="020B0600000101010101" pitchFamily="34" charset="-127"/>
+                <a:ea typeface="BM DoHyeon OTF" panose="020B0600000101010101" pitchFamily="34" charset="-127"/>
+              </a:rPr>
+              <a:t>형태소 변환기를 사용한 존댓말 반말 변환기</a:t>
+            </a:r>
+            <a:endParaRPr kumimoji="1" lang="ko-Kore-KR" altLang="en-US" sz="3200" dirty="0">
+              <a:latin typeface="BM DoHyeon OTF" panose="020B0600000101010101" pitchFamily="34" charset="-127"/>
+              <a:ea typeface="BM DoHyeon OTF" panose="020B0600000101010101" pitchFamily="34" charset="-127"/>
+            </a:endParaRPr>
+          </a:p>
+        </p:txBody>
+      </p:sp>
+      <p:sp>
+        <p:nvSpPr>
+          <p:cNvPr id="3" name="내용 개체 틀 2">
+            <a:extLst>
+              <a:ext uri="{FF2B5EF4-FFF2-40B4-BE49-F238E27FC236}">
+                <a16:creationId xmlns:a16="http://schemas.microsoft.com/office/drawing/2014/main" id="{F0A06DA7-D300-B14F-A5AA-F3A6A5A3250D}"/>
+              </a:ext>
+            </a:extLst>
+          </p:cNvPr>
+          <p:cNvSpPr>
+            <a:spLocks noGrp="1"/>
+          </p:cNvSpPr>
+          <p:nvPr>
+            <p:ph idx="1"/>
+          </p:nvPr>
+        </p:nvSpPr>
+        <p:spPr/>
+        <p:txBody>
+          <a:bodyPr>
+            <a:normAutofit lnSpcReduction="10000"/>
+          </a:bodyPr>
+          <a:lstStyle/>
+          <a:p>
+            <a:pPr lvl="0" latinLnBrk="1">
+              <a:lnSpc>
+                <a:spcPct val="150000"/>
+              </a:lnSpc>
+            </a:pPr>
+            <a:r>
+              <a:rPr lang="ko-KR" altLang="en-US" b="1" dirty="0"/>
+              <a:t>구현 원리</a:t>
+            </a:r>
+            <a:r>
+              <a:rPr lang="en-US" altLang="ko-Kore-KR" dirty="0"/>
+              <a:t>: </a:t>
+            </a:r>
+            <a:r>
+              <a:rPr lang="ko-KR" altLang="ko-Kore-KR" dirty="0"/>
+              <a:t>한국어 존댓말 반말 </a:t>
+            </a:r>
+            <a:r>
+              <a:rPr lang="ko-KR" altLang="ko-Kore-KR" dirty="0" err="1"/>
+              <a:t>변횐기를</a:t>
+            </a:r>
+            <a:r>
+              <a:rPr lang="ko-KR" altLang="ko-Kore-KR" dirty="0"/>
+              <a:t> 만드는 것을 구현하는 것에 있어</a:t>
+            </a:r>
+            <a:r>
+              <a:rPr lang="en-US" altLang="ko-Kore-KR" dirty="0"/>
+              <a:t>, </a:t>
+            </a:r>
+            <a:r>
+              <a:rPr lang="ko-KR" altLang="ko-Kore-KR" dirty="0"/>
+              <a:t>존댓말과 반말의 차이를 만드는 것이 문장의 특정 위치</a:t>
+            </a:r>
+            <a:r>
+              <a:rPr lang="en-US" altLang="ko-Kore-KR" dirty="0"/>
+              <a:t>(</a:t>
+            </a:r>
+            <a:r>
+              <a:rPr lang="ko-KR" altLang="ko-Kore-KR" dirty="0"/>
+              <a:t>또는 형태소</a:t>
+            </a:r>
+            <a:r>
+              <a:rPr lang="en-US" altLang="ko-Kore-KR" dirty="0"/>
+              <a:t>)</a:t>
+            </a:r>
+            <a:r>
+              <a:rPr lang="ko-KR" altLang="ko-Kore-KR" dirty="0"/>
+              <a:t>에 나타나는 특정 어휘들에 의해 일어난다고 생각했습니다</a:t>
+            </a:r>
+            <a:r>
+              <a:rPr lang="en-US" altLang="ko-Kore-KR" dirty="0"/>
+              <a:t>.</a:t>
+            </a:r>
+            <a:r>
+              <a:rPr lang="ko-KR" altLang="ko-Kore-KR" dirty="0"/>
+              <a:t>그래서 형태소 분석기를 사용하여 문장의 구성 요소들과 이들 각각에 대응하는 형태소를 알아낸 뒤 존댓말</a:t>
+            </a:r>
+            <a:r>
+              <a:rPr lang="en-US" altLang="ko-Kore-KR" dirty="0"/>
+              <a:t>, </a:t>
+            </a:r>
+            <a:r>
+              <a:rPr lang="ko-KR" altLang="ko-Kore-KR" dirty="0"/>
+              <a:t>반말 어휘가 나타나는 </a:t>
+            </a:r>
+            <a:r>
+              <a:rPr lang="en-US" altLang="ko-Kore-KR" dirty="0"/>
+              <a:t>‘</a:t>
+            </a:r>
+            <a:r>
+              <a:rPr lang="ko-KR" altLang="ko-Kore-KR" dirty="0"/>
+              <a:t>어말 어미</a:t>
+            </a:r>
+            <a:r>
+              <a:rPr lang="en-US" altLang="ko-Kore-KR" dirty="0"/>
+              <a:t>’ </a:t>
+            </a:r>
+            <a:r>
+              <a:rPr lang="ko-KR" altLang="ko-Kore-KR" dirty="0"/>
+              <a:t>등에 집중하여 이에 대응하는 어휘들을 교체하는 작업을 진행하였습니다</a:t>
+            </a:r>
+            <a:r>
+              <a:rPr lang="en-US" altLang="ko-Kore-KR" dirty="0"/>
+              <a:t>.</a:t>
+            </a:r>
+            <a:endParaRPr lang="ko-Kore-KR" altLang="ko-Kore-KR" dirty="0"/>
+          </a:p>
+          <a:p>
+            <a:endParaRPr kumimoji="1" lang="ko-Kore-KR" altLang="en-US" dirty="0"/>
+          </a:p>
+        </p:txBody>
+      </p:sp>
+    </p:spTree>
+    <p:extLst>
+      <p:ext uri="{BB962C8B-B14F-4D97-AF65-F5344CB8AC3E}">
+        <p14:creationId xmlns:p14="http://schemas.microsoft.com/office/powerpoint/2010/main" val="1002566453"/>
+      </p:ext>
+    </p:extLst>
+  </p:cSld>
+  <p:clrMapOvr>
+    <a:masterClrMapping/>
+  </p:clrMapOvr>
+</p:sld>
+</file>
+
+<file path=ppt/slides/slide3.xml><?xml version="1.0" encoding="utf-8"?>
+<p:sld xmlns:a="http://schemas.openxmlformats.org/drawingml/2006/main" xmlns:r="http://schemas.openxmlformats.org/officeDocument/2006/relationships" xmlns:p="http://schemas.openxmlformats.org/presentationml/2006/main">
+  <p:cSld>
+    <p:spTree>
+      <p:nvGrpSpPr>
+        <p:cNvPr id="1" name=""/>
+        <p:cNvGrpSpPr/>
+        <p:nvPr/>
+      </p:nvGrpSpPr>
+      <p:grpSpPr>
+        <a:xfrm>
+          <a:off x="0" y="0"/>
+          <a:ext cx="0" cy="0"/>
+          <a:chOff x="0" y="0"/>
+          <a:chExt cx="0" cy="0"/>
+        </a:xfrm>
+      </p:grpSpPr>
+      <p:sp>
+        <p:nvSpPr>
           <p:cNvPr id="4" name="TextBox 3">
             <a:extLst>
               <a:ext uri="{FF2B5EF4-FFF2-40B4-BE49-F238E27FC236}">
@@ -3915,7 +4286,7 @@
 </p:sld>
 </file>
 
-<file path=ppt/slides/slide2.xml><?xml version="1.0" encoding="utf-8"?>
+<file path=ppt/slides/slide4.xml><?xml version="1.0" encoding="utf-8"?>
 <p:sld xmlns:a="http://schemas.openxmlformats.org/drawingml/2006/main" xmlns:r="http://schemas.openxmlformats.org/officeDocument/2006/relationships" xmlns:p="http://schemas.openxmlformats.org/presentationml/2006/main">
   <p:cSld>
     <p:spTree>
@@ -4517,7 +4888,7 @@
 </p:sld>
 </file>
 
-<file path=ppt/slides/slide3.xml><?xml version="1.0" encoding="utf-8"?>
+<file path=ppt/slides/slide5.xml><?xml version="1.0" encoding="utf-8"?>
 <p:sld xmlns:a="http://schemas.openxmlformats.org/drawingml/2006/main" xmlns:r="http://schemas.openxmlformats.org/officeDocument/2006/relationships" xmlns:p="http://schemas.openxmlformats.org/presentationml/2006/main">
   <p:cSld>
     <p:spTree>
@@ -4549,7 +4920,7 @@
         <p:spPr>
           <a:xfrm>
             <a:off x="1715722" y="1911860"/>
-            <a:ext cx="6098058" cy="3139321"/>
+            <a:ext cx="6098058" cy="2585323"/>
           </a:xfrm>
           <a:prstGeom prst="rect">
             <a:avLst/>
@@ -4561,48 +4932,6 @@
             <a:spAutoFit/>
           </a:bodyPr>
           <a:lstStyle/>
-          <a:p>
-            <a:pPr marL="285750" indent="-285750">
-              <a:buFontTx/>
-              <a:buChar char="-"/>
-            </a:pPr>
-            <a:r>
-              <a:rPr lang="ko-KR" altLang="en-US" b="1" dirty="0"/>
-              <a:t>형태소 분석은 형태소 분석 모듈인 </a:t>
-            </a:r>
-            <a:r>
-              <a:rPr lang="en-US" altLang="ko-KR" b="1" dirty="0" err="1">
-                <a:solidFill>
-                  <a:srgbClr val="002060"/>
-                </a:solidFill>
-              </a:rPr>
-              <a:t>Mecab</a:t>
-            </a:r>
-            <a:r>
-              <a:rPr lang="ko-KR" altLang="en-US" b="1" dirty="0"/>
-              <a:t>과 카카오의 </a:t>
-            </a:r>
-            <a:r>
-              <a:rPr lang="en-US" altLang="ko-KR" b="1" dirty="0" err="1">
-                <a:solidFill>
-                  <a:srgbClr val="002060"/>
-                </a:solidFill>
-              </a:rPr>
-              <a:t>Khaiii</a:t>
-            </a:r>
-            <a:r>
-              <a:rPr lang="ko-KR" altLang="en-US" b="1" dirty="0" err="1"/>
-              <a:t>를</a:t>
-            </a:r>
-            <a:r>
-              <a:rPr lang="ko-KR" altLang="en-US" b="1" dirty="0"/>
-              <a:t> 사용하고 있습니다</a:t>
-            </a:r>
-            <a:r>
-              <a:rPr lang="en-US" altLang="ko-KR" b="1" dirty="0"/>
-              <a:t>.</a:t>
-            </a:r>
-          </a:p>
           <a:p>
             <a:r>
               <a:rPr lang="en-US" altLang="ko-KR" b="1" dirty="0">

</xml_diff>